<commit_message>
update README.md technoloy section
</commit_message>
<xml_diff>
--- a/Rutgers Mixology overview.pptx
+++ b/Rutgers Mixology overview.pptx
@@ -5993,7 +5993,31 @@
             </a:pPr>
             <a:r>
               <a:rPr lang="en-US" dirty="0"/>
-              <a:t>APIs: Cocktail DB, google maps</a:t>
+              <a:t>APIs: Cocktail DB</a:t>
+            </a:r>
+            <a:r>
+              <a:rPr lang="en-US"/>
+              <a:t>, </a:t>
+            </a:r>
+            <a:r>
+              <a:rPr lang="en-US" smtClean="0"/>
+              <a:t>geoLocation</a:t>
+            </a:r>
+            <a:r>
+              <a:rPr lang="en-US" dirty="0"/>
+              <a:t>, </a:t>
+            </a:r>
+            <a:r>
+              <a:rPr lang="en-US" dirty="0" err="1"/>
+              <a:t>geoCoding</a:t>
+            </a:r>
+            <a:r>
+              <a:rPr lang="en-US" dirty="0" smtClean="0"/>
+              <a:t>, google </a:t>
+            </a:r>
+            <a:r>
+              <a:rPr lang="en-US" dirty="0"/>
+              <a:t>maps</a:t>
             </a:r>
           </a:p>
           <a:p>

</xml_diff>